<commit_message>
add summary diagram draft
</commit_message>
<xml_diff>
--- a/static/topic_assets/chronic_rhinosinusitis/crs-summary.pptx
+++ b/static/topic_assets/chronic_rhinosinusitis/crs-summary.pptx
@@ -2975,6 +2975,104 @@
       </p:grpSpPr>
       <p:cxnSp>
         <p:nvCxnSpPr>
+          <p:cNvPr id="15" name="Straight Arrow Connector 14">
+            <a:extLst>
+              <a:ext uri="{FF2B5EF4-FFF2-40B4-BE49-F238E27FC236}">
+                <a16:creationId xmlns:a16="http://schemas.microsoft.com/office/drawing/2014/main" id="{FA7AED0C-ED6C-D2D6-80E5-1EC4C5A68D6F}"/>
+              </a:ext>
+            </a:extLst>
+          </p:cNvPr>
+          <p:cNvCxnSpPr>
+            <a:stCxn id="10" idx="1"/>
+            <a:endCxn id="13" idx="3"/>
+          </p:cNvCxnSpPr>
+          <p:nvPr/>
+        </p:nvCxnSpPr>
+        <p:spPr>
+          <a:xfrm flipH="1">
+            <a:off x="3438301" y="1441488"/>
+            <a:ext cx="1621910" cy="0"/>
+          </a:xfrm>
+          <a:prstGeom prst="straightConnector1">
+            <a:avLst/>
+          </a:prstGeom>
+          <a:ln>
+            <a:tailEnd type="triangle"/>
+          </a:ln>
+        </p:spPr>
+        <p:style>
+          <a:lnRef idx="2">
+            <a:schemeClr val="accent2"/>
+          </a:lnRef>
+          <a:fillRef idx="0">
+            <a:schemeClr val="accent2"/>
+          </a:fillRef>
+          <a:effectRef idx="1">
+            <a:schemeClr val="accent2"/>
+          </a:effectRef>
+          <a:fontRef idx="minor">
+            <a:schemeClr val="tx1"/>
+          </a:fontRef>
+        </p:style>
+      </p:cxnSp>
+      <p:sp>
+        <p:nvSpPr>
+          <p:cNvPr id="18" name="TextBox 17">
+            <a:extLst>
+              <a:ext uri="{FF2B5EF4-FFF2-40B4-BE49-F238E27FC236}">
+                <a16:creationId xmlns:a16="http://schemas.microsoft.com/office/drawing/2014/main" id="{52298364-727B-3616-5604-A45B4F8B2A60}"/>
+              </a:ext>
+            </a:extLst>
+          </p:cNvPr>
+          <p:cNvSpPr txBox="1"/>
+          <p:nvPr/>
+        </p:nvSpPr>
+        <p:spPr>
+          <a:xfrm>
+            <a:off x="3657600" y="1118139"/>
+            <a:ext cx="1177190" cy="646331"/>
+          </a:xfrm>
+          <a:prstGeom prst="rect">
+            <a:avLst/>
+          </a:prstGeom>
+        </p:spPr>
+        <p:style>
+          <a:lnRef idx="2">
+            <a:schemeClr val="accent2"/>
+          </a:lnRef>
+          <a:fillRef idx="1">
+            <a:schemeClr val="lt1"/>
+          </a:fillRef>
+          <a:effectRef idx="0">
+            <a:schemeClr val="accent2"/>
+          </a:effectRef>
+          <a:fontRef idx="minor">
+            <a:schemeClr val="dk1"/>
+          </a:fontRef>
+        </p:style>
+        <p:txBody>
+          <a:bodyPr wrap="square" rtlCol="0">
+            <a:spAutoFit/>
+          </a:bodyPr>
+          <a:lstStyle/>
+          <a:p>
+            <a:pPr algn="r"/>
+            <a:r>
+              <a:rPr lang="en-US" dirty="0"/>
+              <a:t>Red</a:t>
+            </a:r>
+          </a:p>
+          <a:p>
+            <a:pPr algn="r"/>
+            <a:r>
+              <a:rPr lang="en-US" dirty="0"/>
+              <a:t>Flags</a:t>
+            </a:r>
+          </a:p>
+        </p:txBody>
+      </p:sp>
+      <p:cxnSp>
+        <p:nvCxnSpPr>
           <p:cNvPr id="90" name="Curved Connector 89">
             <a:extLst>
               <a:ext uri="{FF2B5EF4-FFF2-40B4-BE49-F238E27FC236}">
@@ -3123,7 +3221,7 @@
             <a:pPr algn="ctr"/>
             <a:r>
               <a:rPr lang="en-US" sz="1200" b="1" dirty="0"/>
-              <a:t>≥2 for &gt;12 weeks:</a:t>
+              <a:t>≥2 for ≥12 weeks:</a:t>
             </a:r>
           </a:p>
           <a:p>
@@ -3221,48 +3319,6 @@
           </a:p>
         </p:txBody>
       </p:sp>
-      <p:cxnSp>
-        <p:nvCxnSpPr>
-          <p:cNvPr id="15" name="Straight Arrow Connector 14">
-            <a:extLst>
-              <a:ext uri="{FF2B5EF4-FFF2-40B4-BE49-F238E27FC236}">
-                <a16:creationId xmlns:a16="http://schemas.microsoft.com/office/drawing/2014/main" id="{FA7AED0C-ED6C-D2D6-80E5-1EC4C5A68D6F}"/>
-              </a:ext>
-            </a:extLst>
-          </p:cNvPr>
-          <p:cNvCxnSpPr>
-            <a:stCxn id="10" idx="1"/>
-            <a:endCxn id="13" idx="3"/>
-          </p:cNvCxnSpPr>
-          <p:nvPr/>
-        </p:nvCxnSpPr>
-        <p:spPr>
-          <a:xfrm flipH="1">
-            <a:off x="3438301" y="1441488"/>
-            <a:ext cx="1621910" cy="0"/>
-          </a:xfrm>
-          <a:prstGeom prst="straightConnector1">
-            <a:avLst/>
-          </a:prstGeom>
-          <a:ln>
-            <a:tailEnd type="triangle"/>
-          </a:ln>
-        </p:spPr>
-        <p:style>
-          <a:lnRef idx="2">
-            <a:schemeClr val="accent2"/>
-          </a:lnRef>
-          <a:fillRef idx="0">
-            <a:schemeClr val="accent2"/>
-          </a:fillRef>
-          <a:effectRef idx="1">
-            <a:schemeClr val="accent2"/>
-          </a:effectRef>
-          <a:fontRef idx="minor">
-            <a:schemeClr val="tx1"/>
-          </a:fontRef>
-        </p:style>
-      </p:cxnSp>
       <p:pic>
         <p:nvPicPr>
           <p:cNvPr id="17" name="Graphic 16" descr="Flag with solid fill">
@@ -3301,47 +3357,6 @@
       </p:pic>
       <p:sp>
         <p:nvSpPr>
-          <p:cNvPr id="18" name="TextBox 17">
-            <a:extLst>
-              <a:ext uri="{FF2B5EF4-FFF2-40B4-BE49-F238E27FC236}">
-                <a16:creationId xmlns:a16="http://schemas.microsoft.com/office/drawing/2014/main" id="{52298364-727B-3616-5604-A45B4F8B2A60}"/>
-              </a:ext>
-            </a:extLst>
-          </p:cNvPr>
-          <p:cNvSpPr txBox="1"/>
-          <p:nvPr/>
-        </p:nvSpPr>
-        <p:spPr>
-          <a:xfrm>
-            <a:off x="4132303" y="1118139"/>
-            <a:ext cx="842187" cy="646331"/>
-          </a:xfrm>
-          <a:prstGeom prst="rect">
-            <a:avLst/>
-          </a:prstGeom>
-          <a:noFill/>
-        </p:spPr>
-        <p:txBody>
-          <a:bodyPr wrap="square" rtlCol="0">
-            <a:spAutoFit/>
-          </a:bodyPr>
-          <a:lstStyle/>
-          <a:p>
-            <a:r>
-              <a:rPr lang="en-US" dirty="0"/>
-              <a:t>Red</a:t>
-            </a:r>
-          </a:p>
-          <a:p>
-            <a:r>
-              <a:rPr lang="en-US" dirty="0"/>
-              <a:t>Flags</a:t>
-            </a:r>
-          </a:p>
-        </p:txBody>
-      </p:sp>
-      <p:sp>
-        <p:nvSpPr>
           <p:cNvPr id="19" name="Rounded Rectangle 18">
             <a:extLst>
               <a:ext uri="{FF2B5EF4-FFF2-40B4-BE49-F238E27FC236}">
@@ -3767,13 +3782,13 @@
           </a:prstGeom>
         </p:spPr>
         <p:style>
-          <a:lnRef idx="1">
-            <a:schemeClr val="accent6"/>
+          <a:lnRef idx="3">
+            <a:schemeClr val="lt1"/>
           </a:lnRef>
-          <a:fillRef idx="3">
+          <a:fillRef idx="1">
             <a:schemeClr val="accent6"/>
           </a:fillRef>
-          <a:effectRef idx="2">
+          <a:effectRef idx="1">
             <a:schemeClr val="accent6"/>
           </a:effectRef>
           <a:fontRef idx="minor">

</xml_diff>